<commit_message>
Updated material after lesson
</commit_message>
<xml_diff>
--- a/12.Threads/ThreadsPresentation.pptx
+++ b/12.Threads/ThreadsPresentation.pptx
@@ -5,7 +5,7 @@
     <p:sldMasterId id="2147483661" r:id="rId1"/>
   </p:sldMasterIdLst>
   <p:notesMasterIdLst>
-    <p:notesMasterId r:id="rId11"/>
+    <p:notesMasterId r:id="rId10"/>
   </p:notesMasterIdLst>
   <p:sldIdLst>
     <p:sldId id="256" r:id="rId2"/>
@@ -16,24 +16,23 @@
     <p:sldId id="278" r:id="rId7"/>
     <p:sldId id="268" r:id="rId8"/>
     <p:sldId id="279" r:id="rId9"/>
-    <p:sldId id="280" r:id="rId10"/>
   </p:sldIdLst>
   <p:sldSz cx="9144000" cy="6858000" type="screen4x3"/>
   <p:notesSz cx="6858000" cy="9144000"/>
   <p:embeddedFontLst>
     <p:embeddedFont>
       <p:font typeface="Calibri" panose="020F0502020204030204" pitchFamily="34" charset="0"/>
-      <p:regular r:id="rId12"/>
-      <p:bold r:id="rId13"/>
-      <p:italic r:id="rId14"/>
-      <p:boldItalic r:id="rId15"/>
+      <p:regular r:id="rId11"/>
+      <p:bold r:id="rId12"/>
+      <p:italic r:id="rId13"/>
+      <p:boldItalic r:id="rId14"/>
     </p:embeddedFont>
     <p:embeddedFont>
       <p:font typeface="Roboto" panose="020B0604020202020204" charset="0"/>
-      <p:regular r:id="rId16"/>
-      <p:bold r:id="rId17"/>
-      <p:italic r:id="rId18"/>
-      <p:boldItalic r:id="rId19"/>
+      <p:regular r:id="rId15"/>
+      <p:bold r:id="rId16"/>
+      <p:italic r:id="rId17"/>
+      <p:boldItalic r:id="rId18"/>
     </p:embeddedFont>
   </p:embeddedFontLst>
   <p:defaultTextStyle>
@@ -2819,199 +2818,6 @@
     <p:extLst>
       <p:ext uri="{BB962C8B-B14F-4D97-AF65-F5344CB8AC3E}">
         <p14:creationId xmlns:p14="http://schemas.microsoft.com/office/powerpoint/2010/main" val="413766906"/>
-      </p:ext>
-    </p:extLst>
-  </p:cSld>
-  <p:clrMapOvr>
-    <a:masterClrMapping/>
-  </p:clrMapOvr>
-</p:notes>
-</file>
-
-<file path=ppt/notesSlides/notesSlide9.xml><?xml version="1.0" encoding="utf-8"?>
-<p:notes xmlns:a="http://schemas.openxmlformats.org/drawingml/2006/main" xmlns:r="http://schemas.openxmlformats.org/officeDocument/2006/relationships" xmlns:p="http://schemas.openxmlformats.org/presentationml/2006/main" showMasterSp="0" showMasterPhAnim="0">
-  <p:cSld>
-    <p:spTree>
-      <p:nvGrpSpPr>
-        <p:cNvPr id="1" name="Shape 152"/>
-        <p:cNvGrpSpPr/>
-        <p:nvPr/>
-      </p:nvGrpSpPr>
-      <p:grpSpPr>
-        <a:xfrm>
-          <a:off x="0" y="0"/>
-          <a:ext cx="0" cy="0"/>
-          <a:chOff x="0" y="0"/>
-          <a:chExt cx="0" cy="0"/>
-        </a:xfrm>
-      </p:grpSpPr>
-      <p:sp>
-        <p:nvSpPr>
-          <p:cNvPr id="153" name="Shape 153"/>
-          <p:cNvSpPr>
-            <a:spLocks noGrp="1" noRot="1" noChangeAspect="1"/>
-          </p:cNvSpPr>
-          <p:nvPr>
-            <p:ph type="sldImg" idx="2"/>
-          </p:nvPr>
-        </p:nvSpPr>
-        <p:spPr>
-          <a:xfrm>
-            <a:off x="1143000" y="685800"/>
-            <a:ext cx="4572000" cy="3429000"/>
-          </a:xfrm>
-          <a:custGeom>
-            <a:avLst/>
-            <a:gdLst/>
-            <a:ahLst/>
-            <a:cxnLst/>
-            <a:rect l="0" t="0" r="0" b="0"/>
-            <a:pathLst>
-              <a:path w="120000" h="120000" extrusionOk="0">
-                <a:moveTo>
-                  <a:pt x="0" y="0"/>
-                </a:moveTo>
-                <a:lnTo>
-                  <a:pt x="120000" y="0"/>
-                </a:lnTo>
-                <a:lnTo>
-                  <a:pt x="120000" y="120000"/>
-                </a:lnTo>
-                <a:lnTo>
-                  <a:pt x="0" y="120000"/>
-                </a:lnTo>
-                <a:close/>
-              </a:path>
-            </a:pathLst>
-          </a:custGeom>
-          <a:noFill/>
-          <a:ln w="9525" cap="flat" cmpd="sng">
-            <a:solidFill>
-              <a:srgbClr val="000000"/>
-            </a:solidFill>
-            <a:prstDash val="solid"/>
-            <a:miter lim="800000"/>
-            <a:headEnd type="none" w="med" len="med"/>
-            <a:tailEnd type="none" w="med" len="med"/>
-          </a:ln>
-        </p:spPr>
-      </p:sp>
-      <p:sp>
-        <p:nvSpPr>
-          <p:cNvPr id="154" name="Shape 154"/>
-          <p:cNvSpPr txBox="1">
-            <a:spLocks noGrp="1"/>
-          </p:cNvSpPr>
-          <p:nvPr>
-            <p:ph type="body" idx="1"/>
-          </p:nvPr>
-        </p:nvSpPr>
-        <p:spPr>
-          <a:xfrm>
-            <a:off x="685800" y="4343400"/>
-            <a:ext cx="5486400" cy="4114800"/>
-          </a:xfrm>
-          <a:prstGeom prst="rect">
-            <a:avLst/>
-          </a:prstGeom>
-          <a:noFill/>
-          <a:ln>
-            <a:noFill/>
-          </a:ln>
-        </p:spPr>
-        <p:txBody>
-          <a:bodyPr spcFirstLastPara="1" wrap="square" lIns="91425" tIns="45700" rIns="91425" bIns="45700" anchor="t" anchorCtr="0">
-            <a:noAutofit/>
-          </a:bodyPr>
-          <a:lstStyle/>
-          <a:p>
-            <a:pPr marL="0" marR="0" lvl="0" indent="0" algn="l" rtl="0">
-              <a:spcBef>
-                <a:spcPts val="0"/>
-              </a:spcBef>
-              <a:spcAft>
-                <a:spcPts val="0"/>
-              </a:spcAft>
-              <a:buNone/>
-            </a:pPr>
-            <a:endParaRPr sz="1200" b="0" i="0" u="none" strike="noStrike" cap="none">
-              <a:solidFill>
-                <a:schemeClr val="dk1"/>
-              </a:solidFill>
-              <a:latin typeface="Calibri"/>
-              <a:ea typeface="Calibri"/>
-              <a:cs typeface="Calibri"/>
-              <a:sym typeface="Calibri"/>
-            </a:endParaRPr>
-          </a:p>
-        </p:txBody>
-      </p:sp>
-      <p:sp>
-        <p:nvSpPr>
-          <p:cNvPr id="155" name="Shape 155"/>
-          <p:cNvSpPr txBox="1">
-            <a:spLocks noGrp="1"/>
-          </p:cNvSpPr>
-          <p:nvPr>
-            <p:ph type="sldNum" idx="12"/>
-          </p:nvPr>
-        </p:nvSpPr>
-        <p:spPr>
-          <a:xfrm>
-            <a:off x="3884613" y="8685213"/>
-            <a:ext cx="2971800" cy="457200"/>
-          </a:xfrm>
-          <a:prstGeom prst="rect">
-            <a:avLst/>
-          </a:prstGeom>
-          <a:noFill/>
-          <a:ln>
-            <a:noFill/>
-          </a:ln>
-        </p:spPr>
-        <p:txBody>
-          <a:bodyPr spcFirstLastPara="1" wrap="square" lIns="91425" tIns="45700" rIns="91425" bIns="45700" anchor="b" anchorCtr="0">
-            <a:noAutofit/>
-          </a:bodyPr>
-          <a:lstStyle/>
-          <a:p>
-            <a:pPr marL="0" marR="0" lvl="0" indent="0" algn="r" rtl="0">
-              <a:spcBef>
-                <a:spcPts val="0"/>
-              </a:spcBef>
-              <a:spcAft>
-                <a:spcPts val="0"/>
-              </a:spcAft>
-              <a:buNone/>
-            </a:pPr>
-            <a:fld id="{00000000-1234-1234-1234-123412341234}" type="slidenum">
-              <a:rPr lang="en-US" sz="1200" b="0" i="0" u="none" strike="noStrike" cap="none">
-                <a:solidFill>
-                  <a:schemeClr val="dk1"/>
-                </a:solidFill>
-                <a:latin typeface="Calibri"/>
-                <a:ea typeface="Calibri"/>
-                <a:cs typeface="Calibri"/>
-                <a:sym typeface="Calibri"/>
-              </a:rPr>
-              <a:t>9</a:t>
-            </a:fld>
-            <a:endParaRPr sz="1200" b="0" i="0" u="none" strike="noStrike" cap="none">
-              <a:solidFill>
-                <a:schemeClr val="dk1"/>
-              </a:solidFill>
-              <a:latin typeface="Calibri"/>
-              <a:ea typeface="Calibri"/>
-              <a:cs typeface="Calibri"/>
-              <a:sym typeface="Calibri"/>
-            </a:endParaRPr>
-          </a:p>
-        </p:txBody>
-      </p:sp>
-    </p:spTree>
-    <p:extLst>
-      <p:ext uri="{BB962C8B-B14F-4D97-AF65-F5344CB8AC3E}">
-        <p14:creationId xmlns:p14="http://schemas.microsoft.com/office/powerpoint/2010/main" val="2912638722"/>
       </p:ext>
     </p:extLst>
   </p:cSld>
@@ -21599,7 +21405,7 @@
                 <a:ea typeface="Roboto"/>
                 <a:sym typeface="Calibri"/>
               </a:rPr>
-              <a:t>заранее создает набор потоков, а когда прходит задача на выполнение, просто использует один из созданых потоков.</a:t>
+              <a:t>заранее создает набор потоков, а когда проходит задача на выполнение, просто использует один из созданых потоков.</a:t>
             </a:r>
             <a:r>
               <a:rPr lang="en-US" sz="2000" dirty="0">
@@ -22245,7 +22051,7 @@
                 <a:ea typeface="Roboto"/>
                 <a:sym typeface="Calibri"/>
               </a:rPr>
-              <a:t> не должны выполняться долше нескольких секунд </a:t>
+              <a:t> не должны выполняться дольше нескольких секунд </a:t>
             </a:r>
           </a:p>
           <a:p>
@@ -22294,614 +22100,6 @@
     <p:extLst>
       <p:ext uri="{BB962C8B-B14F-4D97-AF65-F5344CB8AC3E}">
         <p14:creationId xmlns:p14="http://schemas.microsoft.com/office/powerpoint/2010/main" val="1166262633"/>
-      </p:ext>
-    </p:extLst>
-  </p:cSld>
-  <p:clrMapOvr>
-    <a:masterClrMapping/>
-  </p:clrMapOvr>
-  <p:transition>
-    <p:fade/>
-  </p:transition>
-</p:sld>
-</file>
-
-<file path=ppt/slides/slide9.xml><?xml version="1.0" encoding="utf-8"?>
-<p:sld xmlns:a="http://schemas.openxmlformats.org/drawingml/2006/main" xmlns:r="http://schemas.openxmlformats.org/officeDocument/2006/relationships" xmlns:p="http://schemas.openxmlformats.org/presentationml/2006/main">
-  <p:cSld>
-    <p:spTree>
-      <p:nvGrpSpPr>
-        <p:cNvPr id="1" name="Shape 156"/>
-        <p:cNvGrpSpPr/>
-        <p:nvPr/>
-      </p:nvGrpSpPr>
-      <p:grpSpPr>
-        <a:xfrm>
-          <a:off x="0" y="0"/>
-          <a:ext cx="0" cy="0"/>
-          <a:chOff x="0" y="0"/>
-          <a:chExt cx="0" cy="0"/>
-        </a:xfrm>
-      </p:grpSpPr>
-      <p:sp>
-        <p:nvSpPr>
-          <p:cNvPr id="158" name="Shape 158"/>
-          <p:cNvSpPr txBox="1">
-            <a:spLocks noGrp="1"/>
-          </p:cNvSpPr>
-          <p:nvPr>
-            <p:ph type="title"/>
-          </p:nvPr>
-        </p:nvSpPr>
-        <p:spPr>
-          <a:xfrm>
-            <a:off x="467326" y="1277488"/>
-            <a:ext cx="8229600" cy="1143000"/>
-          </a:xfrm>
-          <a:prstGeom prst="rect">
-            <a:avLst/>
-          </a:prstGeom>
-          <a:noFill/>
-          <a:ln>
-            <a:noFill/>
-          </a:ln>
-        </p:spPr>
-        <p:txBody>
-          <a:bodyPr spcFirstLastPara="1" wrap="square" lIns="91425" tIns="45700" rIns="91425" bIns="45700" anchor="ctr" anchorCtr="0">
-            <a:noAutofit/>
-          </a:bodyPr>
-          <a:lstStyle/>
-          <a:p>
-            <a:pPr marL="0" marR="0" lvl="0" indent="0" algn="l" rtl="0">
-              <a:spcBef>
-                <a:spcPts val="0"/>
-              </a:spcBef>
-              <a:spcAft>
-                <a:spcPts val="0"/>
-              </a:spcAft>
-              <a:buClr>
-                <a:schemeClr val="dk1"/>
-              </a:buClr>
-              <a:buSzPts val="4400"/>
-              <a:buFont typeface="Calibri"/>
-              <a:buNone/>
-            </a:pPr>
-            <a:r>
-              <a:rPr lang="ru-RU" sz="4100" b="1" i="0" u="none" strike="noStrike" cap="none" dirty="0">
-                <a:solidFill>
-                  <a:srgbClr val="262626"/>
-                </a:solidFill>
-                <a:latin typeface="Roboto"/>
-                <a:ea typeface="Roboto"/>
-                <a:cs typeface="Roboto"/>
-                <a:sym typeface="Roboto"/>
-              </a:rPr>
-              <a:t>Ограничения </a:t>
-            </a:r>
-            <a:r>
-              <a:rPr lang="en-US" sz="4100" b="1" i="0" u="none" strike="noStrike" cap="none" dirty="0" err="1">
-                <a:solidFill>
-                  <a:srgbClr val="262626"/>
-                </a:solidFill>
-                <a:latin typeface="Roboto"/>
-                <a:ea typeface="Roboto"/>
-                <a:cs typeface="Roboto"/>
-                <a:sym typeface="Roboto"/>
-              </a:rPr>
-              <a:t>ThreadPool</a:t>
-            </a:r>
-            <a:endParaRPr sz="4100" b="1" i="0" u="none" strike="noStrike" cap="none" dirty="0">
-              <a:solidFill>
-                <a:srgbClr val="262626"/>
-              </a:solidFill>
-              <a:latin typeface="Roboto"/>
-              <a:ea typeface="Roboto"/>
-              <a:cs typeface="Roboto"/>
-              <a:sym typeface="Roboto"/>
-            </a:endParaRPr>
-          </a:p>
-        </p:txBody>
-      </p:sp>
-      <p:sp>
-        <p:nvSpPr>
-          <p:cNvPr id="159" name="Shape 159"/>
-          <p:cNvSpPr/>
-          <p:nvPr/>
-        </p:nvSpPr>
-        <p:spPr>
-          <a:xfrm>
-            <a:off x="7145316" y="408237"/>
-            <a:ext cx="1856100" cy="290400"/>
-          </a:xfrm>
-          <a:prstGeom prst="roundRect">
-            <a:avLst>
-              <a:gd name="adj" fmla="val 0"/>
-            </a:avLst>
-          </a:prstGeom>
-          <a:noFill/>
-          <a:ln>
-            <a:noFill/>
-          </a:ln>
-        </p:spPr>
-        <p:txBody>
-          <a:bodyPr spcFirstLastPara="1" wrap="square" lIns="91425" tIns="45700" rIns="91425" bIns="45700" anchor="ctr" anchorCtr="0">
-            <a:noAutofit/>
-          </a:bodyPr>
-          <a:lstStyle/>
-          <a:p>
-            <a:pPr marL="0" marR="0" lvl="0" indent="0" algn="ctr" rtl="0">
-              <a:spcBef>
-                <a:spcPts val="0"/>
-              </a:spcBef>
-              <a:spcAft>
-                <a:spcPts val="0"/>
-              </a:spcAft>
-              <a:buClr>
-                <a:schemeClr val="lt1"/>
-              </a:buClr>
-              <a:buSzPts val="1200"/>
-              <a:buFont typeface="Arial"/>
-              <a:buNone/>
-            </a:pPr>
-            <a:r>
-              <a:rPr lang="en-US" sz="1500" b="1" i="0" strike="noStrike" cap="none">
-                <a:solidFill>
-                  <a:srgbClr val="262626"/>
-                </a:solidFill>
-                <a:latin typeface="Roboto"/>
-                <a:ea typeface="Roboto"/>
-                <a:cs typeface="Roboto"/>
-                <a:sym typeface="Roboto"/>
-              </a:rPr>
-              <a:t>www.itea.ua</a:t>
-            </a:r>
-            <a:endParaRPr sz="1500" b="1" i="0" strike="noStrike" cap="none">
-              <a:solidFill>
-                <a:srgbClr val="262626"/>
-              </a:solidFill>
-              <a:latin typeface="Roboto"/>
-              <a:ea typeface="Roboto"/>
-              <a:cs typeface="Roboto"/>
-              <a:sym typeface="Roboto"/>
-            </a:endParaRPr>
-          </a:p>
-        </p:txBody>
-      </p:sp>
-      <p:sp>
-        <p:nvSpPr>
-          <p:cNvPr id="160" name="Shape 160"/>
-          <p:cNvSpPr/>
-          <p:nvPr/>
-        </p:nvSpPr>
-        <p:spPr>
-          <a:xfrm rot="10800000" flipH="1">
-            <a:off x="0" y="1127850"/>
-            <a:ext cx="3143100" cy="42300"/>
-          </a:xfrm>
-          <a:prstGeom prst="rect">
-            <a:avLst/>
-          </a:prstGeom>
-          <a:solidFill>
-            <a:srgbClr val="CC0000"/>
-          </a:solidFill>
-          <a:ln>
-            <a:noFill/>
-          </a:ln>
-        </p:spPr>
-        <p:txBody>
-          <a:bodyPr spcFirstLastPara="1" wrap="square" lIns="91425" tIns="91425" rIns="91425" bIns="91425" anchor="ctr" anchorCtr="0">
-            <a:noAutofit/>
-          </a:bodyPr>
-          <a:lstStyle/>
-          <a:p>
-            <a:pPr marL="0" lvl="0" indent="0">
-              <a:spcBef>
-                <a:spcPts val="0"/>
-              </a:spcBef>
-              <a:spcAft>
-                <a:spcPts val="0"/>
-              </a:spcAft>
-              <a:buNone/>
-            </a:pPr>
-            <a:r>
-              <a:rPr lang="en-US"/>
-              <a:t>                                                                                     </a:t>
-            </a:r>
-            <a:endParaRPr/>
-          </a:p>
-        </p:txBody>
-      </p:sp>
-      <p:sp>
-        <p:nvSpPr>
-          <p:cNvPr id="161" name="Shape 161"/>
-          <p:cNvSpPr/>
-          <p:nvPr/>
-        </p:nvSpPr>
-        <p:spPr>
-          <a:xfrm rot="10800000" flipH="1">
-            <a:off x="3067050" y="1127850"/>
-            <a:ext cx="3143100" cy="42300"/>
-          </a:xfrm>
-          <a:prstGeom prst="rect">
-            <a:avLst/>
-          </a:prstGeom>
-          <a:solidFill>
-            <a:srgbClr val="262626"/>
-          </a:solidFill>
-          <a:ln>
-            <a:noFill/>
-          </a:ln>
-        </p:spPr>
-        <p:txBody>
-          <a:bodyPr spcFirstLastPara="1" wrap="square" lIns="91425" tIns="91425" rIns="91425" bIns="91425" anchor="ctr" anchorCtr="0">
-            <a:noAutofit/>
-          </a:bodyPr>
-          <a:lstStyle/>
-          <a:p>
-            <a:pPr marL="0" lvl="0" indent="0">
-              <a:spcBef>
-                <a:spcPts val="0"/>
-              </a:spcBef>
-              <a:spcAft>
-                <a:spcPts val="0"/>
-              </a:spcAft>
-              <a:buNone/>
-            </a:pPr>
-            <a:endParaRPr/>
-          </a:p>
-        </p:txBody>
-      </p:sp>
-      <p:pic>
-        <p:nvPicPr>
-          <p:cNvPr id="162" name="Shape 162"/>
-          <p:cNvPicPr preferRelativeResize="0"/>
-          <p:nvPr/>
-        </p:nvPicPr>
-        <p:blipFill>
-          <a:blip r:embed="rId3">
-            <a:alphaModFix/>
-          </a:blip>
-          <a:stretch>
-            <a:fillRect/>
-          </a:stretch>
-        </p:blipFill>
-        <p:spPr>
-          <a:xfrm>
-            <a:off x="353700" y="302000"/>
-            <a:ext cx="1741800" cy="502875"/>
-          </a:xfrm>
-          <a:prstGeom prst="rect">
-            <a:avLst/>
-          </a:prstGeom>
-          <a:noFill/>
-          <a:ln>
-            <a:noFill/>
-          </a:ln>
-        </p:spPr>
-      </p:pic>
-      <p:sp>
-        <p:nvSpPr>
-          <p:cNvPr id="163" name="Shape 163"/>
-          <p:cNvSpPr txBox="1"/>
-          <p:nvPr/>
-        </p:nvSpPr>
-        <p:spPr>
-          <a:xfrm>
-            <a:off x="495374" y="2420487"/>
-            <a:ext cx="8181300" cy="4029275"/>
-          </a:xfrm>
-          <a:prstGeom prst="rect">
-            <a:avLst/>
-          </a:prstGeom>
-          <a:noFill/>
-          <a:ln>
-            <a:noFill/>
-          </a:ln>
-        </p:spPr>
-        <p:txBody>
-          <a:bodyPr spcFirstLastPara="1" wrap="square" lIns="91425" tIns="45700" rIns="91425" bIns="45700" anchor="ctr" anchorCtr="0">
-            <a:noAutofit/>
-          </a:bodyPr>
-          <a:lstStyle/>
-          <a:p>
-            <a:pPr lvl="0" indent="-12700">
-              <a:spcAft>
-                <a:spcPts val="1200"/>
-              </a:spcAft>
-              <a:buSzPts val="2000"/>
-              <a:buFont typeface="Noto Sans Symbols"/>
-              <a:buChar char="▪"/>
-            </a:pPr>
-            <a:r>
-              <a:rPr lang="ru-RU" sz="2000" dirty="0">
-                <a:latin typeface="Roboto"/>
-                <a:ea typeface="Roboto"/>
-                <a:sym typeface="Calibri"/>
-              </a:rPr>
-              <a:t> В потоках </a:t>
-            </a:r>
-            <a:r>
-              <a:rPr lang="en-US" sz="2000" dirty="0" err="1">
-                <a:latin typeface="Roboto"/>
-                <a:ea typeface="Roboto"/>
-                <a:sym typeface="Calibri"/>
-              </a:rPr>
-              <a:t>ThreadPool</a:t>
-            </a:r>
-            <a:r>
-              <a:rPr lang="ru-RU" sz="2000" dirty="0">
-                <a:latin typeface="Roboto"/>
-                <a:ea typeface="Roboto"/>
-                <a:sym typeface="Calibri"/>
-              </a:rPr>
-              <a:t> нельзя использовать </a:t>
-            </a:r>
-            <a:r>
-              <a:rPr lang="en-US" sz="2000" dirty="0">
-                <a:latin typeface="Roboto"/>
-                <a:ea typeface="Roboto"/>
-                <a:sym typeface="Calibri"/>
-              </a:rPr>
-              <a:t>Abort()</a:t>
-            </a:r>
-          </a:p>
-          <a:p>
-            <a:pPr lvl="0" indent="-12700">
-              <a:spcAft>
-                <a:spcPts val="1200"/>
-              </a:spcAft>
-              <a:buSzPts val="2000"/>
-              <a:buFont typeface="Noto Sans Symbols"/>
-              <a:buChar char="▪"/>
-            </a:pPr>
-            <a:r>
-              <a:rPr lang="en-US" sz="2000" dirty="0">
-                <a:latin typeface="Roboto"/>
-                <a:ea typeface="Roboto"/>
-                <a:sym typeface="Calibri"/>
-              </a:rPr>
-              <a:t> </a:t>
-            </a:r>
-            <a:r>
-              <a:rPr lang="ru-RU" sz="2000" dirty="0">
-                <a:latin typeface="Roboto"/>
-                <a:ea typeface="Roboto"/>
-                <a:sym typeface="Calibri"/>
-              </a:rPr>
-              <a:t>Нет явного способа узнать о завершении работы потока</a:t>
-            </a:r>
-            <a:r>
-              <a:rPr lang="en-US" sz="2000" dirty="0">
-                <a:latin typeface="Roboto"/>
-                <a:ea typeface="Roboto"/>
-                <a:sym typeface="Calibri"/>
-              </a:rPr>
-              <a:t>  </a:t>
-            </a:r>
-            <a:r>
-              <a:rPr lang="ru-RU" sz="2000" dirty="0">
-                <a:latin typeface="Roboto"/>
-                <a:ea typeface="Roboto"/>
-                <a:sym typeface="Calibri"/>
-              </a:rPr>
-              <a:t>из </a:t>
-            </a:r>
-            <a:r>
-              <a:rPr lang="en-US" sz="2000" dirty="0" err="1">
-                <a:latin typeface="Roboto"/>
-                <a:ea typeface="Roboto"/>
-                <a:sym typeface="Calibri"/>
-              </a:rPr>
-              <a:t>ThreadPool</a:t>
-            </a:r>
-            <a:r>
-              <a:rPr lang="ru-RU" sz="2000" dirty="0">
-                <a:latin typeface="Roboto"/>
-                <a:ea typeface="Roboto"/>
-                <a:sym typeface="Calibri"/>
-              </a:rPr>
-              <a:t>. Нет </a:t>
-            </a:r>
-            <a:r>
-              <a:rPr lang="en-US" sz="2000" dirty="0">
-                <a:latin typeface="Roboto"/>
-                <a:ea typeface="Roboto"/>
-                <a:sym typeface="Calibri"/>
-              </a:rPr>
-              <a:t>Join()</a:t>
-            </a:r>
-          </a:p>
-          <a:p>
-            <a:pPr lvl="0" indent="-12700">
-              <a:spcAft>
-                <a:spcPts val="1200"/>
-              </a:spcAft>
-              <a:buSzPts val="2000"/>
-              <a:buFont typeface="Noto Sans Symbols"/>
-              <a:buChar char="▪"/>
-            </a:pPr>
-            <a:r>
-              <a:rPr lang="en-US" sz="2000" dirty="0">
-                <a:latin typeface="Roboto"/>
-                <a:ea typeface="Roboto"/>
-                <a:sym typeface="Calibri"/>
-              </a:rPr>
-              <a:t> </a:t>
-            </a:r>
-            <a:r>
-              <a:rPr lang="ru-RU" sz="2000" dirty="0">
-                <a:latin typeface="Roboto"/>
-                <a:ea typeface="Roboto"/>
-                <a:sym typeface="Calibri"/>
-              </a:rPr>
-              <a:t>В потоках</a:t>
-            </a:r>
-            <a:r>
-              <a:rPr lang="en-US" sz="2000" dirty="0">
-                <a:latin typeface="Roboto"/>
-                <a:ea typeface="Roboto"/>
-                <a:sym typeface="Calibri"/>
-              </a:rPr>
-              <a:t> </a:t>
-            </a:r>
-            <a:r>
-              <a:rPr lang="en-US" sz="2000" dirty="0" err="1">
-                <a:latin typeface="Roboto"/>
-                <a:ea typeface="Roboto"/>
-                <a:sym typeface="Calibri"/>
-              </a:rPr>
-              <a:t>ThreadPool</a:t>
-            </a:r>
-            <a:r>
-              <a:rPr lang="en-US" sz="2000" dirty="0">
-                <a:latin typeface="Roboto"/>
-                <a:ea typeface="Roboto"/>
-                <a:sym typeface="Calibri"/>
-              </a:rPr>
-              <a:t> </a:t>
-            </a:r>
-            <a:r>
-              <a:rPr lang="ru-RU" sz="2000" dirty="0">
-                <a:latin typeface="Roboto"/>
-                <a:ea typeface="Roboto"/>
-                <a:sym typeface="Calibri"/>
-              </a:rPr>
-              <a:t>нет возможности работать с </a:t>
-            </a:r>
-            <a:r>
-              <a:rPr lang="en-US" sz="2000" dirty="0">
-                <a:latin typeface="Roboto"/>
-                <a:ea typeface="Roboto"/>
-                <a:sym typeface="Calibri"/>
-              </a:rPr>
-              <a:t>UI </a:t>
-            </a:r>
-            <a:r>
-              <a:rPr lang="ru-RU" sz="2000" dirty="0">
-                <a:latin typeface="Roboto"/>
-                <a:ea typeface="Roboto"/>
-                <a:sym typeface="Calibri"/>
-              </a:rPr>
-              <a:t>за исключением елементарных</a:t>
-            </a:r>
-            <a:r>
-              <a:rPr lang="en-US" sz="2000" dirty="0">
-                <a:latin typeface="Roboto"/>
-                <a:ea typeface="Roboto"/>
-                <a:sym typeface="Calibri"/>
-              </a:rPr>
-              <a:t> </a:t>
-            </a:r>
-            <a:r>
-              <a:rPr lang="en-US" sz="2000" dirty="0" err="1">
-                <a:latin typeface="Roboto"/>
-                <a:ea typeface="Roboto"/>
-                <a:sym typeface="Calibri"/>
-              </a:rPr>
-              <a:t>MessageBox</a:t>
-            </a:r>
-            <a:r>
-              <a:rPr lang="en-US" sz="2000" dirty="0">
-                <a:latin typeface="Roboto"/>
-                <a:ea typeface="Roboto"/>
-                <a:sym typeface="Calibri"/>
-              </a:rPr>
-              <a:t>’</a:t>
-            </a:r>
-            <a:r>
-              <a:rPr lang="ru-RU" sz="2000" dirty="0">
-                <a:latin typeface="Roboto"/>
-                <a:ea typeface="Roboto"/>
-                <a:sym typeface="Calibri"/>
-              </a:rPr>
-              <a:t>ов </a:t>
-            </a:r>
-            <a:endParaRPr lang="en-US" sz="2000" dirty="0">
-              <a:latin typeface="Roboto"/>
-              <a:ea typeface="Roboto"/>
-              <a:sym typeface="Calibri"/>
-            </a:endParaRPr>
-          </a:p>
-          <a:p>
-            <a:pPr lvl="0" indent="-12700">
-              <a:spcAft>
-                <a:spcPts val="1200"/>
-              </a:spcAft>
-              <a:buSzPts val="2000"/>
-              <a:buFont typeface="Noto Sans Symbols"/>
-              <a:buChar char="▪"/>
-            </a:pPr>
-            <a:r>
-              <a:rPr lang="ru-RU" sz="2000" dirty="0">
-                <a:latin typeface="Roboto"/>
-                <a:ea typeface="Roboto"/>
-                <a:sym typeface="Calibri"/>
-              </a:rPr>
-              <a:t> Потоки в </a:t>
-            </a:r>
-            <a:r>
-              <a:rPr lang="en-US" sz="2000" dirty="0" err="1">
-                <a:latin typeface="Roboto"/>
-                <a:ea typeface="Roboto"/>
-                <a:sym typeface="Calibri"/>
-              </a:rPr>
-              <a:t>ThreadPool</a:t>
-            </a:r>
-            <a:r>
-              <a:rPr lang="ru-RU" sz="2000" dirty="0">
-                <a:latin typeface="Roboto"/>
-                <a:ea typeface="Roboto"/>
-                <a:sym typeface="Calibri"/>
-              </a:rPr>
-              <a:t> не должны выполняться долше нескольких секунд </a:t>
-            </a:r>
-          </a:p>
-          <a:p>
-            <a:pPr lvl="0" indent="-12700">
-              <a:spcAft>
-                <a:spcPts val="1200"/>
-              </a:spcAft>
-              <a:buSzPts val="2000"/>
-              <a:buFont typeface="Noto Sans Symbols"/>
-              <a:buChar char="▪"/>
-            </a:pPr>
-            <a:r>
-              <a:rPr lang="ru-RU" sz="2000" dirty="0">
-                <a:latin typeface="Roboto"/>
-                <a:ea typeface="Roboto"/>
-                <a:sym typeface="Calibri"/>
-              </a:rPr>
-              <a:t> Поток в </a:t>
-            </a:r>
-            <a:r>
-              <a:rPr lang="en-US" sz="2000" dirty="0" err="1">
-                <a:latin typeface="Roboto"/>
-                <a:ea typeface="Roboto"/>
-                <a:sym typeface="Calibri"/>
-              </a:rPr>
-              <a:t>ThreadPool</a:t>
-            </a:r>
-            <a:r>
-              <a:rPr lang="ru-RU" sz="2000" dirty="0">
-                <a:latin typeface="Roboto"/>
-                <a:ea typeface="Roboto"/>
-                <a:sym typeface="Calibri"/>
-              </a:rPr>
-              <a:t> не должен блокироваться на длительное время </a:t>
-            </a:r>
-            <a:endParaRPr sz="2000" i="0" u="none" strike="noStrike" cap="none" dirty="0">
-              <a:latin typeface="Roboto"/>
-              <a:ea typeface="Roboto"/>
-              <a:cs typeface="Roboto"/>
-              <a:sym typeface="Roboto"/>
-            </a:endParaRPr>
-          </a:p>
-        </p:txBody>
-      </p:sp>
-    </p:spTree>
-    <p:extLst>
-      <p:ext uri="{BB962C8B-B14F-4D97-AF65-F5344CB8AC3E}">
-        <p14:creationId xmlns:p14="http://schemas.microsoft.com/office/powerpoint/2010/main" val="1793745612"/>
       </p:ext>
     </p:extLst>
   </p:cSld>

</xml_diff>